<commit_message>
add book edit book done
</commit_message>
<xml_diff>
--- a/Project_Document/Presentation Library_Management_System.pptx
+++ b/Project_Document/Presentation Library_Management_System.pptx
@@ -115,6 +115,36 @@
       </a:defRPr>
     </a:lvl9pPr>
   </p:defaultTextStyle>
+  <p:extLst>
+    <p:ext uri="{EFAFB233-063F-42B5-8137-9DF3F51BA10A}">
+      <p15:sldGuideLst xmlns:p15="http://schemas.microsoft.com/office/powerpoint/2012/main">
+        <p15:guide id="1" orient="horz" pos="2160">
+          <p15:clr>
+            <a:srgbClr val="A4A3A4"/>
+          </p15:clr>
+        </p15:guide>
+        <p15:guide id="2" pos="3839">
+          <p15:clr>
+            <a:srgbClr val="A4A3A4"/>
+          </p15:clr>
+        </p15:guide>
+      </p15:sldGuideLst>
+    </p:ext>
+    <p:ext uri="{2D200454-40CA-4A62-9FC3-DE9A4176ACB9}">
+      <p15:notesGuideLst xmlns:p15="http://schemas.microsoft.com/office/powerpoint/2012/main">
+        <p15:guide id="1" orient="horz" pos="2880">
+          <p15:clr>
+            <a:srgbClr val="A4A3A4"/>
+          </p15:clr>
+        </p15:guide>
+        <p15:guide id="2" pos="2160">
+          <p15:clr>
+            <a:srgbClr val="A4A3A4"/>
+          </p15:clr>
+        </p15:guide>
+      </p15:notesGuideLst>
+    </p:ext>
+  </p:extLst>
 </p:presentation>
 </file>
 
@@ -1174,24 +1204,10 @@
         </dgm:presLayoutVars>
       </dgm:prSet>
       <dgm:spPr/>
-      <dgm:t>
-        <a:bodyPr/>
-        <a:lstStyle/>
-        <a:p>
-          <a:endParaRPr lang="en-US"/>
-        </a:p>
-      </dgm:t>
     </dgm:pt>
     <dgm:pt modelId="{7A12B315-EA92-4E8C-914E-FCF8B923D9BA}" type="pres">
       <dgm:prSet presAssocID="{477D14C5-CED9-4CFC-B338-DFB0C8090B9F}" presName="circ1" presStyleLbl="vennNode1" presStyleIdx="0" presStyleCnt="3"/>
       <dgm:spPr/>
-      <dgm:t>
-        <a:bodyPr/>
-        <a:lstStyle/>
-        <a:p>
-          <a:endParaRPr lang="en-US"/>
-        </a:p>
-      </dgm:t>
     </dgm:pt>
     <dgm:pt modelId="{1114C5CF-9DB7-4B7A-9D02-B353869E5D38}" type="pres">
       <dgm:prSet presAssocID="{477D14C5-CED9-4CFC-B338-DFB0C8090B9F}" presName="circ1Tx" presStyleLbl="revTx" presStyleIdx="0" presStyleCnt="0">
@@ -1202,24 +1218,10 @@
         </dgm:presLayoutVars>
       </dgm:prSet>
       <dgm:spPr/>
-      <dgm:t>
-        <a:bodyPr/>
-        <a:lstStyle/>
-        <a:p>
-          <a:endParaRPr lang="en-US"/>
-        </a:p>
-      </dgm:t>
     </dgm:pt>
     <dgm:pt modelId="{3469E5A2-93C2-49EF-825C-26E5802651A1}" type="pres">
       <dgm:prSet presAssocID="{3C67E77D-62FA-499D-B5E6-E79A091C5267}" presName="circ2" presStyleLbl="vennNode1" presStyleIdx="1" presStyleCnt="3"/>
       <dgm:spPr/>
-      <dgm:t>
-        <a:bodyPr/>
-        <a:lstStyle/>
-        <a:p>
-          <a:endParaRPr lang="en-US"/>
-        </a:p>
-      </dgm:t>
     </dgm:pt>
     <dgm:pt modelId="{EB02C228-AFBE-4EA8-ADAD-5E115CB980C7}" type="pres">
       <dgm:prSet presAssocID="{3C67E77D-62FA-499D-B5E6-E79A091C5267}" presName="circ2Tx" presStyleLbl="revTx" presStyleIdx="0" presStyleCnt="0">
@@ -1230,24 +1232,10 @@
         </dgm:presLayoutVars>
       </dgm:prSet>
       <dgm:spPr/>
-      <dgm:t>
-        <a:bodyPr/>
-        <a:lstStyle/>
-        <a:p>
-          <a:endParaRPr lang="en-US"/>
-        </a:p>
-      </dgm:t>
     </dgm:pt>
     <dgm:pt modelId="{2B11D8EC-23D3-4EEE-B141-81E29A0B04B6}" type="pres">
       <dgm:prSet presAssocID="{CC6B7442-0B72-4EF2-9F13-1325B51AFF9F}" presName="circ3" presStyleLbl="vennNode1" presStyleIdx="2" presStyleCnt="3"/>
       <dgm:spPr/>
-      <dgm:t>
-        <a:bodyPr/>
-        <a:lstStyle/>
-        <a:p>
-          <a:endParaRPr lang="en-US"/>
-        </a:p>
-      </dgm:t>
     </dgm:pt>
     <dgm:pt modelId="{99560A19-63A4-4F58-BF54-93D1A84B1A1C}" type="pres">
       <dgm:prSet presAssocID="{CC6B7442-0B72-4EF2-9F13-1325B51AFF9F}" presName="circ3Tx" presStyleLbl="revTx" presStyleIdx="0" presStyleCnt="0">
@@ -1258,26 +1246,19 @@
         </dgm:presLayoutVars>
       </dgm:prSet>
       <dgm:spPr/>
-      <dgm:t>
-        <a:bodyPr/>
-        <a:lstStyle/>
-        <a:p>
-          <a:endParaRPr lang="en-US"/>
-        </a:p>
-      </dgm:t>
     </dgm:pt>
   </dgm:ptLst>
   <dgm:cxnLst>
-    <dgm:cxn modelId="{32AA6160-4426-4C4D-93AE-E2F474E37AD9}" srcId="{90119837-5B71-4D44-BB01-DB0B084933C8}" destId="{3C67E77D-62FA-499D-B5E6-E79A091C5267}" srcOrd="1" destOrd="0" parTransId="{5337D229-E330-4525-B0FA-14EC5A80604A}" sibTransId="{C056AC5D-B04E-4376-A1CB-3EAB7BE5AF5B}"/>
-    <dgm:cxn modelId="{98BEF9E1-8D57-4A22-93E0-87299CF8A4AD}" type="presOf" srcId="{CC6B7442-0B72-4EF2-9F13-1325B51AFF9F}" destId="{2B11D8EC-23D3-4EEE-B141-81E29A0B04B6}" srcOrd="0" destOrd="0" presId="urn:microsoft.com/office/officeart/2005/8/layout/venn1"/>
-    <dgm:cxn modelId="{72EC0D90-B3C0-40C5-979A-2051A1711AC2}" type="presOf" srcId="{477D14C5-CED9-4CFC-B338-DFB0C8090B9F}" destId="{7A12B315-EA92-4E8C-914E-FCF8B923D9BA}" srcOrd="0" destOrd="0" presId="urn:microsoft.com/office/officeart/2005/8/layout/venn1"/>
-    <dgm:cxn modelId="{8314FB70-092A-47FB-83E3-C595090DBA48}" type="presOf" srcId="{477D14C5-CED9-4CFC-B338-DFB0C8090B9F}" destId="{1114C5CF-9DB7-4B7A-9D02-B353869E5D38}" srcOrd="1" destOrd="0" presId="urn:microsoft.com/office/officeart/2005/8/layout/venn1"/>
     <dgm:cxn modelId="{7D461F02-AB37-447A-AC6B-D31C4D2EC6A9}" srcId="{90119837-5B71-4D44-BB01-DB0B084933C8}" destId="{477D14C5-CED9-4CFC-B338-DFB0C8090B9F}" srcOrd="0" destOrd="0" parTransId="{92DFCBC7-BC14-4697-8ECD-BF0D5B1EDA3B}" sibTransId="{87E3C0DB-7BEE-424E-8E11-B838D238D595}"/>
     <dgm:cxn modelId="{25C8D00E-7E96-4A36-A375-D219ADDEF7E1}" type="presOf" srcId="{90119837-5B71-4D44-BB01-DB0B084933C8}" destId="{E16D65B4-494C-45C0-82F5-A63E581063CB}" srcOrd="0" destOrd="0" presId="urn:microsoft.com/office/officeart/2005/8/layout/venn1"/>
+    <dgm:cxn modelId="{32AA6160-4426-4C4D-93AE-E2F474E37AD9}" srcId="{90119837-5B71-4D44-BB01-DB0B084933C8}" destId="{3C67E77D-62FA-499D-B5E6-E79A091C5267}" srcOrd="1" destOrd="0" parTransId="{5337D229-E330-4525-B0FA-14EC5A80604A}" sibTransId="{C056AC5D-B04E-4376-A1CB-3EAB7BE5AF5B}"/>
+    <dgm:cxn modelId="{6A7A996A-CD4C-4228-8B30-C5D8E8EDF64D}" type="presOf" srcId="{3C67E77D-62FA-499D-B5E6-E79A091C5267}" destId="{EB02C228-AFBE-4EA8-ADAD-5E115CB980C7}" srcOrd="1" destOrd="0" presId="urn:microsoft.com/office/officeart/2005/8/layout/venn1"/>
+    <dgm:cxn modelId="{102D6D4D-90C9-40F4-A001-35DCC329B127}" srcId="{90119837-5B71-4D44-BB01-DB0B084933C8}" destId="{CC6B7442-0B72-4EF2-9F13-1325B51AFF9F}" srcOrd="2" destOrd="0" parTransId="{E3D139E0-5DC2-4F8E-9F8F-B3F0EBCD4689}" sibTransId="{FF80E1BA-0D6F-4EE8-9640-892A5897DBCD}"/>
+    <dgm:cxn modelId="{8314FB70-092A-47FB-83E3-C595090DBA48}" type="presOf" srcId="{477D14C5-CED9-4CFC-B338-DFB0C8090B9F}" destId="{1114C5CF-9DB7-4B7A-9D02-B353869E5D38}" srcOrd="1" destOrd="0" presId="urn:microsoft.com/office/officeart/2005/8/layout/venn1"/>
+    <dgm:cxn modelId="{72EC0D90-B3C0-40C5-979A-2051A1711AC2}" type="presOf" srcId="{477D14C5-CED9-4CFC-B338-DFB0C8090B9F}" destId="{7A12B315-EA92-4E8C-914E-FCF8B923D9BA}" srcOrd="0" destOrd="0" presId="urn:microsoft.com/office/officeart/2005/8/layout/venn1"/>
     <dgm:cxn modelId="{2F29C697-80C6-4535-BD23-A3D8AD090463}" type="presOf" srcId="{3C67E77D-62FA-499D-B5E6-E79A091C5267}" destId="{3469E5A2-93C2-49EF-825C-26E5802651A1}" srcOrd="0" destOrd="0" presId="urn:microsoft.com/office/officeart/2005/8/layout/venn1"/>
-    <dgm:cxn modelId="{6A7A996A-CD4C-4228-8B30-C5D8E8EDF64D}" type="presOf" srcId="{3C67E77D-62FA-499D-B5E6-E79A091C5267}" destId="{EB02C228-AFBE-4EA8-ADAD-5E115CB980C7}" srcOrd="1" destOrd="0" presId="urn:microsoft.com/office/officeart/2005/8/layout/venn1"/>
     <dgm:cxn modelId="{54CA38E1-8678-4786-A265-770FD25C3115}" type="presOf" srcId="{CC6B7442-0B72-4EF2-9F13-1325B51AFF9F}" destId="{99560A19-63A4-4F58-BF54-93D1A84B1A1C}" srcOrd="1" destOrd="0" presId="urn:microsoft.com/office/officeart/2005/8/layout/venn1"/>
-    <dgm:cxn modelId="{102D6D4D-90C9-40F4-A001-35DCC329B127}" srcId="{90119837-5B71-4D44-BB01-DB0B084933C8}" destId="{CC6B7442-0B72-4EF2-9F13-1325B51AFF9F}" srcOrd="2" destOrd="0" parTransId="{E3D139E0-5DC2-4F8E-9F8F-B3F0EBCD4689}" sibTransId="{FF80E1BA-0D6F-4EE8-9640-892A5897DBCD}"/>
+    <dgm:cxn modelId="{98BEF9E1-8D57-4A22-93E0-87299CF8A4AD}" type="presOf" srcId="{CC6B7442-0B72-4EF2-9F13-1325B51AFF9F}" destId="{2B11D8EC-23D3-4EEE-B141-81E29A0B04B6}" srcOrd="0" destOrd="0" presId="urn:microsoft.com/office/officeart/2005/8/layout/venn1"/>
     <dgm:cxn modelId="{44472F79-9B0F-4D76-8B36-0088629008C0}" type="presParOf" srcId="{E16D65B4-494C-45C0-82F5-A63E581063CB}" destId="{7A12B315-EA92-4E8C-914E-FCF8B923D9BA}" srcOrd="0" destOrd="0" presId="urn:microsoft.com/office/officeart/2005/8/layout/venn1"/>
     <dgm:cxn modelId="{EED42847-ACC7-4B5B-B7A1-8F60C94743CB}" type="presParOf" srcId="{E16D65B4-494C-45C0-82F5-A63E581063CB}" destId="{1114C5CF-9DB7-4B7A-9D02-B353869E5D38}" srcOrd="1" destOrd="0" presId="urn:microsoft.com/office/officeart/2005/8/layout/venn1"/>
     <dgm:cxn modelId="{EA084191-AAFD-4120-8E5D-065F61D9C184}" type="presParOf" srcId="{E16D65B4-494C-45C0-82F5-A63E581063CB}" destId="{3469E5A2-93C2-49EF-825C-26E5802651A1}" srcOrd="2" destOrd="0" presId="urn:microsoft.com/office/officeart/2005/8/layout/venn1"/>
@@ -1289,49 +1270,71 @@
   <dgm:whole/>
   <dgm:extLst>
     <a:ext uri="http://schemas.microsoft.com/office/drawing/2008/diagram">
-      <dsp:dataModelExt xmlns:dsp="http://schemas.microsoft.com/office/drawing/2008/diagram" xmlns="" relId="rId5" minVer="http://schemas.openxmlformats.org/drawingml/2006/diagram"/>
+      <dsp:dataModelExt xmlns:dsp="http://schemas.microsoft.com/office/drawing/2008/diagram" relId="rId6" minVer="http://schemas.openxmlformats.org/drawingml/2006/diagram"/>
     </a:ext>
   </dgm:extLst>
 </dgm:dataModel>
 </file>
 
 <file path=ppt/diagrams/drawing1.xml><?xml version="1.0" encoding="utf-8"?>
-<dsp:drawing xmlns:dgm="http://schemas.openxmlformats.org/drawingml/2006/diagram" xmlns:dsp="http://schemas.microsoft.com/office/drawing/2008/diagram" xmlns:a="http://schemas.openxmlformats.org/drawingml/2006/main" xmlns:r="http://schemas.openxmlformats.org/officeDocument/2006/relationships">
+<dsp:drawing xmlns:dgm="http://schemas.openxmlformats.org/drawingml/2006/diagram" xmlns:dsp="http://schemas.microsoft.com/office/drawing/2008/diagram" xmlns:a="http://schemas.openxmlformats.org/drawingml/2006/main">
   <dsp:spTree>
     <dsp:nvGrpSpPr>
-      <dsp:cNvPr id="2" name="Group 1"/>
+      <dsp:cNvPr id="0" name=""/>
       <dsp:cNvGrpSpPr/>
     </dsp:nvGrpSpPr>
-    <dsp:grpSpPr>
-      <a:xfrm>
-        <a:off x="0" y="0"/>
-        <a:ext cx="4267200" cy="4267200"/>
-        <a:chOff x="0" y="0"/>
-        <a:chExt cx="4267200" cy="4267200"/>
-      </a:xfrm>
-    </dsp:grpSpPr>
+    <dsp:grpSpPr/>
     <dsp:sp modelId="{7A12B315-EA92-4E8C-914E-FCF8B923D9BA}">
       <dsp:nvSpPr>
-        <dsp:cNvPr id="3" name="Oval 2"/>
+        <dsp:cNvPr id="0" name=""/>
         <dsp:cNvSpPr/>
       </dsp:nvSpPr>
-      <dsp:spPr bwMode="white">
+      <dsp:spPr>
         <a:xfrm>
-          <a:off x="929640" y="53340"/>
+          <a:off x="929639" y="53339"/>
           <a:ext cx="2560320" cy="2560320"/>
         </a:xfrm>
         <a:prstGeom prst="ellipse">
           <a:avLst/>
         </a:prstGeom>
+        <a:gradFill rotWithShape="0">
+          <a:gsLst>
+            <a:gs pos="0">
+              <a:schemeClr val="accent2">
+                <a:alpha val="50000"/>
+                <a:hueOff val="0"/>
+                <a:satOff val="0"/>
+                <a:lumOff val="0"/>
+                <a:alphaOff val="0"/>
+                <a:tint val="98000"/>
+                <a:lumMod val="114000"/>
+              </a:schemeClr>
+            </a:gs>
+            <a:gs pos="100000">
+              <a:schemeClr val="accent2">
+                <a:alpha val="50000"/>
+                <a:hueOff val="0"/>
+                <a:satOff val="0"/>
+                <a:lumOff val="0"/>
+                <a:alphaOff val="0"/>
+                <a:shade val="90000"/>
+                <a:lumMod val="84000"/>
+              </a:schemeClr>
+            </a:gs>
+          </a:gsLst>
+          <a:lin ang="5400000" scaled="0"/>
+        </a:gradFill>
+        <a:ln>
+          <a:noFill/>
+        </a:ln>
+        <a:effectLst/>
       </dsp:spPr>
       <dsp:style>
         <a:lnRef idx="0">
-          <a:schemeClr val="lt1"/>
+          <a:scrgbClr r="0" g="0" b="0"/>
         </a:lnRef>
         <a:fillRef idx="3">
-          <a:schemeClr val="accent2">
-            <a:alpha val="50000"/>
-          </a:schemeClr>
+          <a:scrgbClr r="0" g="0" b="0"/>
         </a:fillRef>
         <a:effectRef idx="0">
           <a:scrgbClr r="0" g="0" b="0"/>
@@ -1341,40 +1344,14 @@
         </a:fontRef>
       </dsp:style>
       <dsp:txBody>
-        <a:bodyPr lIns="0" tIns="0" rIns="0" bIns="0" anchor="ctr"/>
-        <a:lstStyle>
-          <a:lvl1pPr algn="ctr">
-            <a:defRPr sz="2400"/>
-          </a:lvl1pPr>
-          <a:lvl2pPr marL="171450" indent="-171450" algn="ctr">
-            <a:defRPr sz="1800"/>
-          </a:lvl2pPr>
-          <a:lvl3pPr marL="342900" indent="-171450" algn="ctr">
-            <a:defRPr sz="1800"/>
-          </a:lvl3pPr>
-          <a:lvl4pPr marL="514350" indent="-171450" algn="ctr">
-            <a:defRPr sz="1800"/>
-          </a:lvl4pPr>
-          <a:lvl5pPr marL="685800" indent="-171450" algn="ctr">
-            <a:defRPr sz="1800"/>
-          </a:lvl5pPr>
-          <a:lvl6pPr marL="857250" indent="-171450" algn="ctr">
-            <a:defRPr sz="1800"/>
-          </a:lvl6pPr>
-          <a:lvl7pPr marL="1028700" indent="-171450" algn="ctr">
-            <a:defRPr sz="1800"/>
-          </a:lvl7pPr>
-          <a:lvl8pPr marL="1200150" indent="-171450" algn="ctr">
-            <a:defRPr sz="1800"/>
-          </a:lvl8pPr>
-          <a:lvl9pPr marL="1371600" indent="-171450" algn="ctr">
-            <a:defRPr sz="1800"/>
-          </a:lvl9pPr>
-        </a:lstStyle>
+        <a:bodyPr spcFirstLastPara="0" vert="horz" wrap="square" lIns="0" tIns="0" rIns="0" bIns="0" numCol="1" spcCol="1270" anchor="ctr" anchorCtr="0">
+          <a:noAutofit/>
+        </a:bodyPr>
+        <a:lstStyle/>
         <a:p>
-          <a:pPr lvl="0">
+          <a:pPr marL="0" lvl="0" indent="0" algn="ctr" defTabSz="1066800">
             <a:lnSpc>
-              <a:spcPct val="100000"/>
+              <a:spcPct val="90000"/>
             </a:lnSpc>
             <a:spcBef>
               <a:spcPct val="0"/>
@@ -1382,49 +1359,70 @@
             <a:spcAft>
               <a:spcPct val="35000"/>
             </a:spcAft>
+            <a:buNone/>
           </a:pPr>
           <a:r>
-            <a:rPr lang="en-US" dirty="0">
-              <a:solidFill>
-                <a:schemeClr val="tx1"/>
-              </a:solidFill>
-            </a:rPr>
+            <a:rPr lang="en-US" sz="2400" kern="1200" dirty="0"/>
             <a:t>Front-end </a:t>
           </a:r>
-          <a:endParaRPr>
-            <a:solidFill>
-              <a:schemeClr val="tx1"/>
-            </a:solidFill>
-          </a:endParaRPr>
         </a:p>
       </dsp:txBody>
       <dsp:txXfrm>
-        <a:off x="929640" y="53340"/>
-        <a:ext cx="2560320" cy="2560320"/>
+        <a:off x="1271015" y="501395"/>
+        <a:ext cx="1877568" cy="1152144"/>
       </dsp:txXfrm>
     </dsp:sp>
     <dsp:sp modelId="{3469E5A2-93C2-49EF-825C-26E5802651A1}">
       <dsp:nvSpPr>
-        <dsp:cNvPr id="4" name="Oval 3"/>
+        <dsp:cNvPr id="0" name=""/>
         <dsp:cNvSpPr/>
       </dsp:nvSpPr>
-      <dsp:spPr bwMode="white">
+      <dsp:spPr>
         <a:xfrm>
-          <a:off x="1853489" y="1653540"/>
+          <a:off x="1853488" y="1653540"/>
           <a:ext cx="2560320" cy="2560320"/>
         </a:xfrm>
         <a:prstGeom prst="ellipse">
           <a:avLst/>
         </a:prstGeom>
+        <a:gradFill rotWithShape="0">
+          <a:gsLst>
+            <a:gs pos="0">
+              <a:schemeClr val="accent3">
+                <a:alpha val="50000"/>
+                <a:hueOff val="0"/>
+                <a:satOff val="0"/>
+                <a:lumOff val="0"/>
+                <a:alphaOff val="0"/>
+                <a:tint val="98000"/>
+                <a:lumMod val="114000"/>
+              </a:schemeClr>
+            </a:gs>
+            <a:gs pos="100000">
+              <a:schemeClr val="accent3">
+                <a:alpha val="50000"/>
+                <a:hueOff val="0"/>
+                <a:satOff val="0"/>
+                <a:lumOff val="0"/>
+                <a:alphaOff val="0"/>
+                <a:shade val="90000"/>
+                <a:lumMod val="84000"/>
+              </a:schemeClr>
+            </a:gs>
+          </a:gsLst>
+          <a:lin ang="5400000" scaled="0"/>
+        </a:gradFill>
+        <a:ln>
+          <a:noFill/>
+        </a:ln>
+        <a:effectLst/>
       </dsp:spPr>
       <dsp:style>
         <a:lnRef idx="0">
-          <a:schemeClr val="lt1"/>
+          <a:scrgbClr r="0" g="0" b="0"/>
         </a:lnRef>
         <a:fillRef idx="3">
-          <a:schemeClr val="accent3">
-            <a:alpha val="50000"/>
-          </a:schemeClr>
+          <a:scrgbClr r="0" g="0" b="0"/>
         </a:fillRef>
         <a:effectRef idx="0">
           <a:scrgbClr r="0" g="0" b="0"/>
@@ -1434,40 +1432,14 @@
         </a:fontRef>
       </dsp:style>
       <dsp:txBody>
-        <a:bodyPr lIns="0" tIns="0" rIns="0" bIns="0" anchor="ctr"/>
-        <a:lstStyle>
-          <a:lvl1pPr algn="ctr">
-            <a:defRPr sz="2400"/>
-          </a:lvl1pPr>
-          <a:lvl2pPr marL="171450" indent="-171450" algn="ctr">
-            <a:defRPr sz="1800"/>
-          </a:lvl2pPr>
-          <a:lvl3pPr marL="342900" indent="-171450" algn="ctr">
-            <a:defRPr sz="1800"/>
-          </a:lvl3pPr>
-          <a:lvl4pPr marL="514350" indent="-171450" algn="ctr">
-            <a:defRPr sz="1800"/>
-          </a:lvl4pPr>
-          <a:lvl5pPr marL="685800" indent="-171450" algn="ctr">
-            <a:defRPr sz="1800"/>
-          </a:lvl5pPr>
-          <a:lvl6pPr marL="857250" indent="-171450" algn="ctr">
-            <a:defRPr sz="1800"/>
-          </a:lvl6pPr>
-          <a:lvl7pPr marL="1028700" indent="-171450" algn="ctr">
-            <a:defRPr sz="1800"/>
-          </a:lvl7pPr>
-          <a:lvl8pPr marL="1200150" indent="-171450" algn="ctr">
-            <a:defRPr sz="1800"/>
-          </a:lvl8pPr>
-          <a:lvl9pPr marL="1371600" indent="-171450" algn="ctr">
-            <a:defRPr sz="1800"/>
-          </a:lvl9pPr>
-        </a:lstStyle>
+        <a:bodyPr spcFirstLastPara="0" vert="horz" wrap="square" lIns="0" tIns="0" rIns="0" bIns="0" numCol="1" spcCol="1270" anchor="ctr" anchorCtr="0">
+          <a:noAutofit/>
+        </a:bodyPr>
+        <a:lstStyle/>
         <a:p>
-          <a:pPr lvl="0">
+          <a:pPr marL="0" lvl="0" indent="0" algn="ctr" defTabSz="1066800">
             <a:lnSpc>
-              <a:spcPct val="100000"/>
+              <a:spcPct val="90000"/>
             </a:lnSpc>
             <a:spcBef>
               <a:spcPct val="0"/>
@@ -1475,33 +1447,25 @@
             <a:spcAft>
               <a:spcPct val="35000"/>
             </a:spcAft>
+            <a:buNone/>
           </a:pPr>
           <a:r>
-            <a:rPr lang="en-US" dirty="0">
-              <a:solidFill>
-                <a:schemeClr val="tx1"/>
-              </a:solidFill>
-            </a:rPr>
+            <a:rPr lang="en-US" sz="2400" kern="1200" dirty="0"/>
             <a:t>Back-end</a:t>
           </a:r>
-          <a:endParaRPr>
-            <a:solidFill>
-              <a:schemeClr val="tx1"/>
-            </a:solidFill>
-          </a:endParaRPr>
         </a:p>
       </dsp:txBody>
       <dsp:txXfrm>
-        <a:off x="1853489" y="1653540"/>
-        <a:ext cx="2560320" cy="2560320"/>
+        <a:off x="2636520" y="2314955"/>
+        <a:ext cx="1536192" cy="1408176"/>
       </dsp:txXfrm>
     </dsp:sp>
     <dsp:sp modelId="{2B11D8EC-23D3-4EEE-B141-81E29A0B04B6}">
       <dsp:nvSpPr>
-        <dsp:cNvPr id="5" name="Oval 4"/>
+        <dsp:cNvPr id="0" name=""/>
         <dsp:cNvSpPr/>
       </dsp:nvSpPr>
-      <dsp:spPr bwMode="white">
+      <dsp:spPr>
         <a:xfrm>
           <a:off x="5791" y="1653540"/>
           <a:ext cx="2560320" cy="2560320"/>
@@ -1509,15 +1473,44 @@
         <a:prstGeom prst="ellipse">
           <a:avLst/>
         </a:prstGeom>
+        <a:gradFill rotWithShape="0">
+          <a:gsLst>
+            <a:gs pos="0">
+              <a:schemeClr val="accent4">
+                <a:alpha val="50000"/>
+                <a:hueOff val="0"/>
+                <a:satOff val="0"/>
+                <a:lumOff val="0"/>
+                <a:alphaOff val="0"/>
+                <a:tint val="98000"/>
+                <a:lumMod val="114000"/>
+              </a:schemeClr>
+            </a:gs>
+            <a:gs pos="100000">
+              <a:schemeClr val="accent4">
+                <a:alpha val="50000"/>
+                <a:hueOff val="0"/>
+                <a:satOff val="0"/>
+                <a:lumOff val="0"/>
+                <a:alphaOff val="0"/>
+                <a:shade val="90000"/>
+                <a:lumMod val="84000"/>
+              </a:schemeClr>
+            </a:gs>
+          </a:gsLst>
+          <a:lin ang="5400000" scaled="0"/>
+        </a:gradFill>
+        <a:ln>
+          <a:noFill/>
+        </a:ln>
+        <a:effectLst/>
       </dsp:spPr>
       <dsp:style>
         <a:lnRef idx="0">
-          <a:schemeClr val="lt1"/>
+          <a:scrgbClr r="0" g="0" b="0"/>
         </a:lnRef>
         <a:fillRef idx="3">
-          <a:schemeClr val="accent4">
-            <a:alpha val="50000"/>
-          </a:schemeClr>
+          <a:scrgbClr r="0" g="0" b="0"/>
         </a:fillRef>
         <a:effectRef idx="0">
           <a:scrgbClr r="0" g="0" b="0"/>
@@ -1527,40 +1520,14 @@
         </a:fontRef>
       </dsp:style>
       <dsp:txBody>
-        <a:bodyPr lIns="0" tIns="0" rIns="0" bIns="0" anchor="ctr"/>
-        <a:lstStyle>
-          <a:lvl1pPr algn="ctr">
-            <a:defRPr sz="2400"/>
-          </a:lvl1pPr>
-          <a:lvl2pPr marL="171450" indent="-171450" algn="ctr">
-            <a:defRPr sz="1800"/>
-          </a:lvl2pPr>
-          <a:lvl3pPr marL="342900" indent="-171450" algn="ctr">
-            <a:defRPr sz="1800"/>
-          </a:lvl3pPr>
-          <a:lvl4pPr marL="514350" indent="-171450" algn="ctr">
-            <a:defRPr sz="1800"/>
-          </a:lvl4pPr>
-          <a:lvl5pPr marL="685800" indent="-171450" algn="ctr">
-            <a:defRPr sz="1800"/>
-          </a:lvl5pPr>
-          <a:lvl6pPr marL="857250" indent="-171450" algn="ctr">
-            <a:defRPr sz="1800"/>
-          </a:lvl6pPr>
-          <a:lvl7pPr marL="1028700" indent="-171450" algn="ctr">
-            <a:defRPr sz="1800"/>
-          </a:lvl7pPr>
-          <a:lvl8pPr marL="1200150" indent="-171450" algn="ctr">
-            <a:defRPr sz="1800"/>
-          </a:lvl8pPr>
-          <a:lvl9pPr marL="1371600" indent="-171450" algn="ctr">
-            <a:defRPr sz="1800"/>
-          </a:lvl9pPr>
-        </a:lstStyle>
+        <a:bodyPr spcFirstLastPara="0" vert="horz" wrap="square" lIns="0" tIns="0" rIns="0" bIns="0" numCol="1" spcCol="1270" anchor="ctr" anchorCtr="0">
+          <a:noAutofit/>
+        </a:bodyPr>
+        <a:lstStyle/>
         <a:p>
-          <a:pPr lvl="0">
+          <a:pPr marL="0" lvl="0" indent="0" algn="ctr" defTabSz="1066800">
             <a:lnSpc>
-              <a:spcPct val="100000"/>
+              <a:spcPct val="90000"/>
             </a:lnSpc>
             <a:spcBef>
               <a:spcPct val="0"/>
@@ -1568,25 +1535,17 @@
             <a:spcAft>
               <a:spcPct val="35000"/>
             </a:spcAft>
+            <a:buNone/>
           </a:pPr>
           <a:r>
-            <a:rPr lang="en-US" dirty="0">
-              <a:solidFill>
-                <a:schemeClr val="tx1"/>
-              </a:solidFill>
-            </a:rPr>
+            <a:rPr lang="en-US" sz="2400" kern="1200" dirty="0"/>
             <a:t>Database</a:t>
           </a:r>
-          <a:endParaRPr>
-            <a:solidFill>
-              <a:schemeClr val="tx1"/>
-            </a:solidFill>
-          </a:endParaRPr>
         </a:p>
       </dsp:txBody>
       <dsp:txXfrm>
-        <a:off x="5791" y="1653540"/>
-        <a:ext cx="2560320" cy="2560320"/>
+        <a:off x="246887" y="2314955"/>
+        <a:ext cx="1536192" cy="1408176"/>
       </dsp:txXfrm>
     </dsp:sp>
   </dsp:spTree>
@@ -3585,7 +3544,7 @@
             <a:fld id="{1C482589-CB2F-4003-801D-095B67490E73}" type="datetimeFigureOut">
               <a:rPr lang="en-US"/>
               <a:pPr/>
-              <a:t>3/27/2022</a:t>
+              <a:t>3/31/2022</a:t>
             </a:fld>
             <a:endParaRPr lang="en-US"/>
           </a:p>
@@ -3659,6 +3618,11 @@
         </p:txBody>
       </p:sp>
     </p:spTree>
+    <p:extLst>
+      <p:ext uri="{BB962C8B-B14F-4D97-AF65-F5344CB8AC3E}">
+        <p14:creationId xmlns:p14="http://schemas.microsoft.com/office/powerpoint/2010/main" val="1"/>
+      </p:ext>
+    </p:extLst>
   </p:cSld>
   <p:clrMap bg1="lt1" tx1="dk1" bg2="lt2" tx2="dk2" accent1="accent1" accent2="accent2" accent3="accent3" accent4="accent4" accent5="accent5" accent6="accent6" hlink="hlink" folHlink="folHlink"/>
 </p:handoutMaster>
@@ -3747,7 +3711,7 @@
             <a:fld id="{2A7D4DBF-746C-4C25-853D-8A1CBE8404F4}" type="datetimeFigureOut">
               <a:rPr lang="en-US"/>
               <a:pPr/>
-              <a:t>3/27/2022</a:t>
+              <a:t>3/31/2022</a:t>
             </a:fld>
             <a:endParaRPr lang="en-US"/>
           </a:p>
@@ -4192,7 +4156,7 @@
             <a:fld id="{4AAD347D-5ACD-4C99-B74B-A9C85AD731AF}" type="datetimeFigureOut">
               <a:rPr lang="en-US" smtClean="0"/>
               <a:pPr/>
-              <a:t>3/27/2022</a:t>
+              <a:t>3/31/2022</a:t>
             </a:fld>
             <a:endParaRPr lang="en-US" dirty="0"/>
           </a:p>
@@ -4246,13 +4210,13 @@
   <p:clrMapOvr>
     <a:masterClrMapping/>
   </p:clrMapOvr>
-  <mc:AlternateContent xmlns:mc="http://schemas.openxmlformats.org/markup-compatibility/2006">
-    <mc:Choice xmlns:p14="http://schemas.microsoft.com/office/powerpoint/2010/main" xmlns="" Requires="p14">
+  <mc:AlternateContent xmlns:mc="http://schemas.openxmlformats.org/markup-compatibility/2006" xmlns:p14="http://schemas.microsoft.com/office/powerpoint/2010/main">
+    <mc:Choice Requires="p14">
       <p:transition spd="med" p14:dur="700">
         <p:fade/>
       </p:transition>
     </mc:Choice>
-    <mc:Fallback>
+    <mc:Fallback xmlns="">
       <p:transition spd="med">
         <p:fade/>
       </p:transition>
@@ -4476,7 +4440,7 @@
             <a:fld id="{881DC1F7-A9E9-4D8B-8C97-C74523B2CF2A}" type="datetimeFigureOut">
               <a:rPr lang="en-US" smtClean="0"/>
               <a:pPr/>
-              <a:t>3/27/2022</a:t>
+              <a:t>3/31/2022</a:t>
             </a:fld>
             <a:endParaRPr lang="en-US"/>
           </a:p>
@@ -4530,13 +4494,13 @@
   <p:clrMapOvr>
     <a:masterClrMapping/>
   </p:clrMapOvr>
-  <mc:AlternateContent xmlns:mc="http://schemas.openxmlformats.org/markup-compatibility/2006">
-    <mc:Choice xmlns:p14="http://schemas.microsoft.com/office/powerpoint/2010/main" xmlns="" Requires="p14">
+  <mc:AlternateContent xmlns:mc="http://schemas.openxmlformats.org/markup-compatibility/2006" xmlns:p14="http://schemas.microsoft.com/office/powerpoint/2010/main">
+    <mc:Choice Requires="p14">
       <p:transition spd="med" p14:dur="700">
         <p:fade/>
       </p:transition>
     </mc:Choice>
-    <mc:Fallback>
+    <mc:Fallback xmlns="">
       <p:transition spd="med">
         <p:fade/>
       </p:transition>
@@ -4679,7 +4643,7 @@
             <a:fld id="{881DC1F7-A9E9-4D8B-8C97-C74523B2CF2A}" type="datetimeFigureOut">
               <a:rPr lang="en-US" smtClean="0"/>
               <a:pPr/>
-              <a:t>3/27/2022</a:t>
+              <a:t>3/31/2022</a:t>
             </a:fld>
             <a:endParaRPr lang="en-US"/>
           </a:p>
@@ -4733,13 +4697,13 @@
   <p:clrMapOvr>
     <a:masterClrMapping/>
   </p:clrMapOvr>
-  <mc:AlternateContent xmlns:mc="http://schemas.openxmlformats.org/markup-compatibility/2006">
-    <mc:Choice xmlns:p14="http://schemas.microsoft.com/office/powerpoint/2010/main" xmlns="" Requires="p14">
+  <mc:AlternateContent xmlns:mc="http://schemas.openxmlformats.org/markup-compatibility/2006" xmlns:p14="http://schemas.microsoft.com/office/powerpoint/2010/main">
+    <mc:Choice Requires="p14">
       <p:transition spd="med" p14:dur="700">
         <p:fade/>
       </p:transition>
     </mc:Choice>
-    <mc:Fallback>
+    <mc:Fallback xmlns="">
       <p:transition spd="med">
         <p:fade/>
       </p:transition>
@@ -4961,7 +4925,7 @@
             <a:fld id="{881DC1F7-A9E9-4D8B-8C97-C74523B2CF2A}" type="datetimeFigureOut">
               <a:rPr lang="en-US" smtClean="0"/>
               <a:pPr/>
-              <a:t>3/27/2022</a:t>
+              <a:t>3/31/2022</a:t>
             </a:fld>
             <a:endParaRPr lang="en-US"/>
           </a:p>
@@ -5109,13 +5073,13 @@
   <p:clrMapOvr>
     <a:masterClrMapping/>
   </p:clrMapOvr>
-  <mc:AlternateContent xmlns:mc="http://schemas.openxmlformats.org/markup-compatibility/2006">
-    <mc:Choice xmlns:p14="http://schemas.microsoft.com/office/powerpoint/2010/main" xmlns="" Requires="p14">
+  <mc:AlternateContent xmlns:mc="http://schemas.openxmlformats.org/markup-compatibility/2006" xmlns:p14="http://schemas.microsoft.com/office/powerpoint/2010/main">
+    <mc:Choice Requires="p14">
       <p:transition spd="med" p14:dur="700">
         <p:fade/>
       </p:transition>
     </mc:Choice>
-    <mc:Fallback>
+    <mc:Fallback xmlns="">
       <p:transition spd="med">
         <p:fade/>
       </p:transition>
@@ -5311,7 +5275,7 @@
             <a:fld id="{881DC1F7-A9E9-4D8B-8C97-C74523B2CF2A}" type="datetimeFigureOut">
               <a:rPr lang="en-US" smtClean="0"/>
               <a:pPr/>
-              <a:t>3/27/2022</a:t>
+              <a:t>3/31/2022</a:t>
             </a:fld>
             <a:endParaRPr lang="en-US"/>
           </a:p>
@@ -5365,13 +5329,13 @@
   <p:clrMapOvr>
     <a:masterClrMapping/>
   </p:clrMapOvr>
-  <mc:AlternateContent xmlns:mc="http://schemas.openxmlformats.org/markup-compatibility/2006">
-    <mc:Choice xmlns:p14="http://schemas.microsoft.com/office/powerpoint/2010/main" xmlns="" Requires="p14">
+  <mc:AlternateContent xmlns:mc="http://schemas.openxmlformats.org/markup-compatibility/2006" xmlns:p14="http://schemas.microsoft.com/office/powerpoint/2010/main">
+    <mc:Choice Requires="p14">
       <p:transition spd="med" p14:dur="700">
         <p:fade/>
       </p:transition>
     </mc:Choice>
-    <mc:Fallback>
+    <mc:Fallback xmlns="">
       <p:transition spd="med">
         <p:fade/>
       </p:transition>
@@ -5943,7 +5907,7 @@
             <a:fld id="{881DC1F7-A9E9-4D8B-8C97-C74523B2CF2A}" type="datetimeFigureOut">
               <a:rPr lang="en-US" smtClean="0"/>
               <a:pPr/>
-              <a:t>3/27/2022</a:t>
+              <a:t>3/31/2022</a:t>
             </a:fld>
             <a:endParaRPr lang="en-US"/>
           </a:p>
@@ -5997,13 +5961,13 @@
   <p:clrMapOvr>
     <a:masterClrMapping/>
   </p:clrMapOvr>
-  <mc:AlternateContent xmlns:mc="http://schemas.openxmlformats.org/markup-compatibility/2006">
-    <mc:Choice xmlns:p14="http://schemas.microsoft.com/office/powerpoint/2010/main" xmlns="" Requires="p14">
+  <mc:AlternateContent xmlns:mc="http://schemas.openxmlformats.org/markup-compatibility/2006" xmlns:p14="http://schemas.microsoft.com/office/powerpoint/2010/main">
+    <mc:Choice Requires="p14">
       <p:transition spd="med" p14:dur="700">
         <p:fade/>
       </p:transition>
     </mc:Choice>
-    <mc:Fallback>
+    <mc:Fallback xmlns="">
       <p:transition spd="med">
         <p:fade/>
       </p:transition>
@@ -6812,7 +6776,7 @@
             <a:fld id="{881DC1F7-A9E9-4D8B-8C97-C74523B2CF2A}" type="datetimeFigureOut">
               <a:rPr lang="en-US" smtClean="0"/>
               <a:pPr/>
-              <a:t>3/27/2022</a:t>
+              <a:t>3/31/2022</a:t>
             </a:fld>
             <a:endParaRPr lang="en-US"/>
           </a:p>
@@ -6866,13 +6830,13 @@
   <p:clrMapOvr>
     <a:masterClrMapping/>
   </p:clrMapOvr>
-  <mc:AlternateContent xmlns:mc="http://schemas.openxmlformats.org/markup-compatibility/2006">
-    <mc:Choice xmlns:p14="http://schemas.microsoft.com/office/powerpoint/2010/main" xmlns="" Requires="p14">
+  <mc:AlternateContent xmlns:mc="http://schemas.openxmlformats.org/markup-compatibility/2006" xmlns:p14="http://schemas.microsoft.com/office/powerpoint/2010/main">
+    <mc:Choice Requires="p14">
       <p:transition spd="med" p14:dur="700">
         <p:fade/>
       </p:transition>
     </mc:Choice>
-    <mc:Fallback>
+    <mc:Fallback xmlns="">
       <p:transition spd="med">
         <p:fade/>
       </p:transition>
@@ -6991,7 +6955,7 @@
             <a:fld id="{881DC1F7-A9E9-4D8B-8C97-C74523B2CF2A}" type="datetimeFigureOut">
               <a:rPr lang="en-US" smtClean="0"/>
               <a:pPr/>
-              <a:t>3/27/2022</a:t>
+              <a:t>3/31/2022</a:t>
             </a:fld>
             <a:endParaRPr lang="en-US"/>
           </a:p>
@@ -7045,13 +7009,13 @@
   <p:clrMapOvr>
     <a:masterClrMapping/>
   </p:clrMapOvr>
-  <mc:AlternateContent xmlns:mc="http://schemas.openxmlformats.org/markup-compatibility/2006">
-    <mc:Choice xmlns:p14="http://schemas.microsoft.com/office/powerpoint/2010/main" xmlns="" Requires="p14">
+  <mc:AlternateContent xmlns:mc="http://schemas.openxmlformats.org/markup-compatibility/2006" xmlns:p14="http://schemas.microsoft.com/office/powerpoint/2010/main">
+    <mc:Choice Requires="p14">
       <p:transition spd="med" p14:dur="700">
         <p:fade/>
       </p:transition>
     </mc:Choice>
-    <mc:Fallback>
+    <mc:Fallback xmlns="">
       <p:transition spd="med">
         <p:fade/>
       </p:transition>
@@ -7180,7 +7144,7 @@
             <a:fld id="{881DC1F7-A9E9-4D8B-8C97-C74523B2CF2A}" type="datetimeFigureOut">
               <a:rPr lang="en-US" smtClean="0"/>
               <a:pPr/>
-              <a:t>3/27/2022</a:t>
+              <a:t>3/31/2022</a:t>
             </a:fld>
             <a:endParaRPr lang="en-US"/>
           </a:p>
@@ -7234,13 +7198,13 @@
   <p:clrMapOvr>
     <a:masterClrMapping/>
   </p:clrMapOvr>
-  <mc:AlternateContent xmlns:mc="http://schemas.openxmlformats.org/markup-compatibility/2006">
-    <mc:Choice xmlns:p14="http://schemas.microsoft.com/office/powerpoint/2010/main" xmlns="" Requires="p14">
+  <mc:AlternateContent xmlns:mc="http://schemas.openxmlformats.org/markup-compatibility/2006" xmlns:p14="http://schemas.microsoft.com/office/powerpoint/2010/main">
+    <mc:Choice Requires="p14">
       <p:transition spd="med" p14:dur="700">
         <p:fade/>
       </p:transition>
     </mc:Choice>
-    <mc:Fallback>
+    <mc:Fallback xmlns="">
       <p:transition spd="med">
         <p:fade/>
       </p:transition>
@@ -7359,7 +7323,7 @@
             <a:fld id="{881DC1F7-A9E9-4D8B-8C97-C74523B2CF2A}" type="datetimeFigureOut">
               <a:rPr lang="en-US" smtClean="0"/>
               <a:pPr/>
-              <a:t>3/27/2022</a:t>
+              <a:t>3/31/2022</a:t>
             </a:fld>
             <a:endParaRPr lang="en-US"/>
           </a:p>
@@ -7413,13 +7377,13 @@
   <p:clrMapOvr>
     <a:masterClrMapping/>
   </p:clrMapOvr>
-  <mc:AlternateContent xmlns:mc="http://schemas.openxmlformats.org/markup-compatibility/2006">
-    <mc:Choice xmlns:p14="http://schemas.microsoft.com/office/powerpoint/2010/main" xmlns="" Requires="p14">
+  <mc:AlternateContent xmlns:mc="http://schemas.openxmlformats.org/markup-compatibility/2006" xmlns:p14="http://schemas.microsoft.com/office/powerpoint/2010/main">
+    <mc:Choice Requires="p14">
       <p:transition spd="med" p14:dur="700">
         <p:fade/>
       </p:transition>
     </mc:Choice>
-    <mc:Fallback>
+    <mc:Fallback xmlns="">
       <p:transition spd="med">
         <p:fade/>
       </p:transition>
@@ -7615,7 +7579,7 @@
             <a:fld id="{881DC1F7-A9E9-4D8B-8C97-C74523B2CF2A}" type="datetimeFigureOut">
               <a:rPr lang="en-US" smtClean="0"/>
               <a:pPr/>
-              <a:t>3/27/2022</a:t>
+              <a:t>3/31/2022</a:t>
             </a:fld>
             <a:endParaRPr lang="en-US"/>
           </a:p>
@@ -7669,13 +7633,13 @@
   <p:clrMapOvr>
     <a:masterClrMapping/>
   </p:clrMapOvr>
-  <mc:AlternateContent xmlns:mc="http://schemas.openxmlformats.org/markup-compatibility/2006">
-    <mc:Choice xmlns:p14="http://schemas.microsoft.com/office/powerpoint/2010/main" xmlns="" Requires="p14">
+  <mc:AlternateContent xmlns:mc="http://schemas.openxmlformats.org/markup-compatibility/2006" xmlns:p14="http://schemas.microsoft.com/office/powerpoint/2010/main">
+    <mc:Choice Requires="p14">
       <p:transition spd="med" p14:dur="700">
         <p:fade/>
       </p:transition>
     </mc:Choice>
-    <mc:Fallback>
+    <mc:Fallback xmlns="">
       <p:transition spd="med">
         <p:fade/>
       </p:transition>
@@ -7916,7 +7880,7 @@
             <a:fld id="{881DC1F7-A9E9-4D8B-8C97-C74523B2CF2A}" type="datetimeFigureOut">
               <a:rPr lang="en-US" smtClean="0"/>
               <a:pPr/>
-              <a:t>3/27/2022</a:t>
+              <a:t>3/31/2022</a:t>
             </a:fld>
             <a:endParaRPr lang="en-US"/>
           </a:p>
@@ -7970,13 +7934,13 @@
   <p:clrMapOvr>
     <a:masterClrMapping/>
   </p:clrMapOvr>
-  <mc:AlternateContent xmlns:mc="http://schemas.openxmlformats.org/markup-compatibility/2006">
-    <mc:Choice xmlns:p14="http://schemas.microsoft.com/office/powerpoint/2010/main" xmlns="" Requires="p14">
+  <mc:AlternateContent xmlns:mc="http://schemas.openxmlformats.org/markup-compatibility/2006" xmlns:p14="http://schemas.microsoft.com/office/powerpoint/2010/main">
+    <mc:Choice Requires="p14">
       <p:transition spd="med" p14:dur="700">
         <p:fade/>
       </p:transition>
     </mc:Choice>
-    <mc:Fallback>
+    <mc:Fallback xmlns="">
       <p:transition spd="med">
         <p:fade/>
       </p:transition>
@@ -8369,7 +8333,7 @@
             <a:fld id="{881DC1F7-A9E9-4D8B-8C97-C74523B2CF2A}" type="datetimeFigureOut">
               <a:rPr lang="en-US" smtClean="0"/>
               <a:pPr/>
-              <a:t>3/27/2022</a:t>
+              <a:t>3/31/2022</a:t>
             </a:fld>
             <a:endParaRPr lang="en-US"/>
           </a:p>
@@ -8423,13 +8387,13 @@
   <p:clrMapOvr>
     <a:masterClrMapping/>
   </p:clrMapOvr>
-  <mc:AlternateContent xmlns:mc="http://schemas.openxmlformats.org/markup-compatibility/2006">
-    <mc:Choice xmlns:p14="http://schemas.microsoft.com/office/powerpoint/2010/main" xmlns="" Requires="p14">
+  <mc:AlternateContent xmlns:mc="http://schemas.openxmlformats.org/markup-compatibility/2006" xmlns:p14="http://schemas.microsoft.com/office/powerpoint/2010/main">
+    <mc:Choice Requires="p14">
       <p:transition spd="med" p14:dur="700">
         <p:fade/>
       </p:transition>
     </mc:Choice>
-    <mc:Fallback>
+    <mc:Fallback xmlns="">
       <p:transition spd="med">
         <p:fade/>
       </p:transition>
@@ -8496,7 +8460,7 @@
             <a:fld id="{881DC1F7-A9E9-4D8B-8C97-C74523B2CF2A}" type="datetimeFigureOut">
               <a:rPr lang="en-US" smtClean="0"/>
               <a:pPr/>
-              <a:t>3/27/2022</a:t>
+              <a:t>3/31/2022</a:t>
             </a:fld>
             <a:endParaRPr lang="en-US"/>
           </a:p>
@@ -8550,13 +8514,13 @@
   <p:clrMapOvr>
     <a:masterClrMapping/>
   </p:clrMapOvr>
-  <mc:AlternateContent xmlns:mc="http://schemas.openxmlformats.org/markup-compatibility/2006">
-    <mc:Choice xmlns:p14="http://schemas.microsoft.com/office/powerpoint/2010/main" xmlns="" Requires="p14">
+  <mc:AlternateContent xmlns:mc="http://schemas.openxmlformats.org/markup-compatibility/2006" xmlns:p14="http://schemas.microsoft.com/office/powerpoint/2010/main">
+    <mc:Choice Requires="p14">
       <p:transition spd="med" p14:dur="700">
         <p:fade/>
       </p:transition>
     </mc:Choice>
-    <mc:Fallback>
+    <mc:Fallback xmlns="">
       <p:transition spd="med">
         <p:fade/>
       </p:transition>
@@ -8600,7 +8564,7 @@
             <a:fld id="{881DC1F7-A9E9-4D8B-8C97-C74523B2CF2A}" type="datetimeFigureOut">
               <a:rPr lang="en-US" smtClean="0"/>
               <a:pPr/>
-              <a:t>3/27/2022</a:t>
+              <a:t>3/31/2022</a:t>
             </a:fld>
             <a:endParaRPr lang="en-US"/>
           </a:p>
@@ -8654,13 +8618,13 @@
   <p:clrMapOvr>
     <a:masterClrMapping/>
   </p:clrMapOvr>
-  <mc:AlternateContent xmlns:mc="http://schemas.openxmlformats.org/markup-compatibility/2006">
-    <mc:Choice xmlns:p14="http://schemas.microsoft.com/office/powerpoint/2010/main" xmlns="" Requires="p14">
+  <mc:AlternateContent xmlns:mc="http://schemas.openxmlformats.org/markup-compatibility/2006" xmlns:p14="http://schemas.microsoft.com/office/powerpoint/2010/main">
+    <mc:Choice Requires="p14">
       <p:transition spd="med" p14:dur="700">
         <p:fade/>
       </p:transition>
     </mc:Choice>
-    <mc:Fallback>
+    <mc:Fallback xmlns="">
       <p:transition spd="med">
         <p:fade/>
       </p:transition>
@@ -8888,7 +8852,7 @@
             <a:fld id="{881DC1F7-A9E9-4D8B-8C97-C74523B2CF2A}" type="datetimeFigureOut">
               <a:rPr lang="en-US" smtClean="0"/>
               <a:pPr/>
-              <a:t>3/27/2022</a:t>
+              <a:t>3/31/2022</a:t>
             </a:fld>
             <a:endParaRPr lang="en-US"/>
           </a:p>
@@ -8942,13 +8906,13 @@
   <p:clrMapOvr>
     <a:masterClrMapping/>
   </p:clrMapOvr>
-  <mc:AlternateContent xmlns:mc="http://schemas.openxmlformats.org/markup-compatibility/2006">
-    <mc:Choice xmlns:p14="http://schemas.microsoft.com/office/powerpoint/2010/main" xmlns="" Requires="p14">
+  <mc:AlternateContent xmlns:mc="http://schemas.openxmlformats.org/markup-compatibility/2006" xmlns:p14="http://schemas.microsoft.com/office/powerpoint/2010/main">
+    <mc:Choice Requires="p14">
       <p:transition spd="med" p14:dur="700">
         <p:fade/>
       </p:transition>
     </mc:Choice>
-    <mc:Fallback>
+    <mc:Fallback xmlns="">
       <p:transition spd="med">
         <p:fade/>
       </p:transition>
@@ -9172,7 +9136,7 @@
             <a:fld id="{881DC1F7-A9E9-4D8B-8C97-C74523B2CF2A}" type="datetimeFigureOut">
               <a:rPr lang="en-US" smtClean="0"/>
               <a:pPr/>
-              <a:t>3/27/2022</a:t>
+              <a:t>3/31/2022</a:t>
             </a:fld>
             <a:endParaRPr lang="en-US"/>
           </a:p>
@@ -9226,13 +9190,13 @@
   <p:clrMapOvr>
     <a:masterClrMapping/>
   </p:clrMapOvr>
-  <mc:AlternateContent xmlns:mc="http://schemas.openxmlformats.org/markup-compatibility/2006">
-    <mc:Choice xmlns:p14="http://schemas.microsoft.com/office/powerpoint/2010/main" xmlns="" Requires="p14">
+  <mc:AlternateContent xmlns:mc="http://schemas.openxmlformats.org/markup-compatibility/2006" xmlns:p14="http://schemas.microsoft.com/office/powerpoint/2010/main">
+    <mc:Choice Requires="p14">
       <p:transition spd="med" p14:dur="700">
         <p:fade/>
       </p:transition>
     </mc:Choice>
-    <mc:Fallback>
+    <mc:Fallback xmlns="">
       <p:transition spd="med">
         <p:fade/>
       </p:transition>
@@ -9275,7 +9239,7 @@
           <a:blip r:embed="rId19">
             <a:extLst>
               <a:ext uri="{28A0092B-C50C-407E-A947-70E740481C1C}">
-                <a14:useLocalDpi xmlns:a14="http://schemas.microsoft.com/office/drawing/2010/main" xmlns="" val="0"/>
+                <a14:useLocalDpi xmlns:a14="http://schemas.microsoft.com/office/drawing/2010/main" val="0"/>
               </a:ext>
             </a:extLst>
           </a:blip>
@@ -9306,7 +9270,7 @@
           <a:blip r:embed="rId20">
             <a:extLst>
               <a:ext uri="{28A0092B-C50C-407E-A947-70E740481C1C}">
-                <a14:useLocalDpi xmlns:a14="http://schemas.microsoft.com/office/drawing/2010/main" xmlns="" val="0"/>
+                <a14:useLocalDpi xmlns:a14="http://schemas.microsoft.com/office/drawing/2010/main" val="0"/>
               </a:ext>
             </a:extLst>
           </a:blip>
@@ -9400,7 +9364,7 @@
           <a:blip r:embed="rId21">
             <a:extLst>
               <a:ext uri="{28A0092B-C50C-407E-A947-70E740481C1C}">
-                <a14:useLocalDpi xmlns:a14="http://schemas.microsoft.com/office/drawing/2010/main" xmlns="" val="0"/>
+                <a14:useLocalDpi xmlns:a14="http://schemas.microsoft.com/office/drawing/2010/main" val="0"/>
               </a:ext>
             </a:extLst>
           </a:blip>
@@ -9431,7 +9395,7 @@
           <a:blip r:embed="rId22">
             <a:extLst>
               <a:ext uri="{28A0092B-C50C-407E-A947-70E740481C1C}">
-                <a14:useLocalDpi xmlns:a14="http://schemas.microsoft.com/office/drawing/2010/main" xmlns="" val="0"/>
+                <a14:useLocalDpi xmlns:a14="http://schemas.microsoft.com/office/drawing/2010/main" val="0"/>
               </a:ext>
             </a:extLst>
           </a:blip>
@@ -9618,7 +9582,7 @@
             <a:fld id="{881DC1F7-A9E9-4D8B-8C97-C74523B2CF2A}" type="datetimeFigureOut">
               <a:rPr lang="en-US" smtClean="0"/>
               <a:pPr/>
-              <a:t>3/27/2022</a:t>
+              <a:t>3/31/2022</a:t>
             </a:fld>
             <a:endParaRPr lang="en-US"/>
           </a:p>
@@ -9726,13 +9690,13 @@
     <p:sldLayoutId id="2147483664" r:id="rId16"/>
     <p:sldLayoutId id="2147483665" r:id="rId17"/>
   </p:sldLayoutIdLst>
-  <mc:AlternateContent xmlns:mc="http://schemas.openxmlformats.org/markup-compatibility/2006">
-    <mc:Choice xmlns:p14="http://schemas.microsoft.com/office/powerpoint/2010/main" xmlns="" Requires="p14">
+  <mc:AlternateContent xmlns:mc="http://schemas.openxmlformats.org/markup-compatibility/2006" xmlns:p14="http://schemas.microsoft.com/office/powerpoint/2010/main">
+    <mc:Choice Requires="p14">
       <p:transition spd="med" p14:dur="700">
         <p:fade/>
       </p:transition>
     </mc:Choice>
-    <mc:Fallback>
+    <mc:Fallback xmlns="">
       <p:transition spd="med">
         <p:fade/>
       </p:transition>
@@ -10272,25 +10236,8 @@
                 <a:latin typeface="Times New Roman" panose="02020603050405020304" pitchFamily="18" charset="0"/>
                 <a:cs typeface="Times New Roman" panose="02020603050405020304" pitchFamily="18" charset="0"/>
               </a:rPr>
-              <a:t>Indian </a:t>
-            </a:r>
-            <a:r>
-              <a:rPr lang="en-US" sz="2800" dirty="0" err="1">
-                <a:solidFill>
-                  <a:srgbClr val="96B86B"/>
-                </a:solidFill>
-                <a:latin typeface="Times New Roman" panose="02020603050405020304" pitchFamily="18" charset="0"/>
-                <a:cs typeface="Times New Roman" panose="02020603050405020304" pitchFamily="18" charset="0"/>
-              </a:rPr>
-              <a:t>Bittu</a:t>
-            </a:r>
-            <a:endParaRPr lang="en-US" sz="2800" dirty="0">
-              <a:solidFill>
-                <a:srgbClr val="96B86B"/>
-              </a:solidFill>
-              <a:latin typeface="Times New Roman" panose="02020603050405020304" pitchFamily="18" charset="0"/>
-              <a:cs typeface="Times New Roman" panose="02020603050405020304" pitchFamily="18" charset="0"/>
-            </a:endParaRPr>
+              <a:t>Indian Bittu</a:t>
+            </a:r>
           </a:p>
           <a:p>
             <a:pPr marL="457200" indent="-457200">
@@ -10305,41 +10252,14 @@
                 <a:latin typeface="Times New Roman" panose="02020603050405020304" pitchFamily="18" charset="0"/>
                 <a:cs typeface="Times New Roman" panose="02020603050405020304" pitchFamily="18" charset="0"/>
               </a:rPr>
-              <a:t>K R </a:t>
-            </a:r>
-            <a:r>
-              <a:rPr lang="en-US" sz="2800" dirty="0" err="1">
-                <a:solidFill>
-                  <a:srgbClr val="96B86B"/>
-                </a:solidFill>
-                <a:latin typeface="Times New Roman" panose="02020603050405020304" pitchFamily="18" charset="0"/>
-                <a:cs typeface="Times New Roman" panose="02020603050405020304" pitchFamily="18" charset="0"/>
-              </a:rPr>
-              <a:t>Adhithya</a:t>
-            </a:r>
-            <a:endParaRPr lang="en-US" sz="2800" dirty="0">
-              <a:solidFill>
-                <a:srgbClr val="96B86B"/>
-              </a:solidFill>
-              <a:latin typeface="Times New Roman" panose="02020603050405020304" pitchFamily="18" charset="0"/>
-              <a:cs typeface="Times New Roman" panose="02020603050405020304" pitchFamily="18" charset="0"/>
-            </a:endParaRPr>
+              <a:t>K R Adhithya</a:t>
+            </a:r>
           </a:p>
           <a:p>
             <a:pPr marL="457200" indent="-457200">
               <a:buFont typeface="Wingdings" panose="05000000000000000000" pitchFamily="2" charset="2"/>
               <a:buChar char="Ø"/>
             </a:pPr>
-            <a:r>
-              <a:rPr lang="en-US" sz="2800" dirty="0" err="1">
-                <a:solidFill>
-                  <a:srgbClr val="96B86B"/>
-                </a:solidFill>
-                <a:latin typeface="Times New Roman" panose="02020603050405020304" pitchFamily="18" charset="0"/>
-                <a:cs typeface="Times New Roman" panose="02020603050405020304" pitchFamily="18" charset="0"/>
-              </a:rPr>
-              <a:t>Sudarshan</a:t>
-            </a:r>
             <a:r>
               <a:rPr lang="en-US" sz="2800" dirty="0">
                 <a:solidFill>
@@ -10348,25 +10268,8 @@
                 <a:latin typeface="Times New Roman" panose="02020603050405020304" pitchFamily="18" charset="0"/>
                 <a:cs typeface="Times New Roman" panose="02020603050405020304" pitchFamily="18" charset="0"/>
               </a:rPr>
-              <a:t> </a:t>
-            </a:r>
-            <a:r>
-              <a:rPr lang="en-US" sz="2800" dirty="0" err="1">
-                <a:solidFill>
-                  <a:srgbClr val="96B86B"/>
-                </a:solidFill>
-                <a:latin typeface="Times New Roman" panose="02020603050405020304" pitchFamily="18" charset="0"/>
-                <a:cs typeface="Times New Roman" panose="02020603050405020304" pitchFamily="18" charset="0"/>
-              </a:rPr>
-              <a:t>reddy</a:t>
-            </a:r>
-            <a:endParaRPr lang="en-US" sz="2800" dirty="0">
-              <a:solidFill>
-                <a:srgbClr val="96B86B"/>
-              </a:solidFill>
-              <a:latin typeface="Times New Roman" panose="02020603050405020304" pitchFamily="18" charset="0"/>
-              <a:cs typeface="Times New Roman" panose="02020603050405020304" pitchFamily="18" charset="0"/>
-            </a:endParaRPr>
+              <a:t>Sudarshan reddy</a:t>
+            </a:r>
           </a:p>
           <a:p>
             <a:pPr marL="457200" indent="-457200">
@@ -10374,7 +10277,7 @@
               <a:buChar char="Ø"/>
             </a:pPr>
             <a:r>
-              <a:rPr lang="en-US" sz="2800" dirty="0" err="1">
+              <a:rPr lang="en-US" sz="2800" dirty="0">
                 <a:solidFill>
                   <a:srgbClr val="96B86B"/>
                 </a:solidFill>
@@ -10383,13 +10286,6 @@
               </a:rPr>
               <a:t>Silpa ER</a:t>
             </a:r>
-            <a:endParaRPr lang="en-US" sz="2800" dirty="0">
-              <a:solidFill>
-                <a:srgbClr val="96B86B"/>
-              </a:solidFill>
-              <a:latin typeface="Times New Roman" panose="02020603050405020304" pitchFamily="18" charset="0"/>
-              <a:cs typeface="Times New Roman" panose="02020603050405020304" pitchFamily="18" charset="0"/>
-            </a:endParaRPr>
           </a:p>
           <a:p>
             <a:pPr marL="457200" indent="-457200">
@@ -10404,25 +10300,8 @@
                 <a:latin typeface="Times New Roman" panose="02020603050405020304" pitchFamily="18" charset="0"/>
                 <a:cs typeface="Times New Roman" panose="02020603050405020304" pitchFamily="18" charset="0"/>
               </a:rPr>
-              <a:t>Harsha Vardhan </a:t>
-            </a:r>
-            <a:r>
-              <a:rPr lang="en-US" sz="2800" dirty="0" err="1">
-                <a:solidFill>
-                  <a:srgbClr val="96B86B"/>
-                </a:solidFill>
-                <a:latin typeface="Times New Roman" panose="02020603050405020304" pitchFamily="18" charset="0"/>
-                <a:cs typeface="Times New Roman" panose="02020603050405020304" pitchFamily="18" charset="0"/>
-              </a:rPr>
-              <a:t>reddy</a:t>
-            </a:r>
-            <a:endParaRPr lang="en-US" sz="2800" dirty="0">
-              <a:solidFill>
-                <a:srgbClr val="96B86B"/>
-              </a:solidFill>
-              <a:latin typeface="Times New Roman" panose="02020603050405020304" pitchFamily="18" charset="0"/>
-              <a:cs typeface="Times New Roman" panose="02020603050405020304" pitchFamily="18" charset="0"/>
-            </a:endParaRPr>
+              <a:t>Harsha Vardhan reddy</a:t>
+            </a:r>
           </a:p>
           <a:p>
             <a:endParaRPr lang="en-US" sz="3600" dirty="0">
@@ -10440,13 +10319,13 @@
   <p:clrMapOvr>
     <a:masterClrMapping/>
   </p:clrMapOvr>
-  <mc:AlternateContent xmlns:mc="http://schemas.openxmlformats.org/markup-compatibility/2006">
-    <mc:Choice xmlns:p14="http://schemas.microsoft.com/office/powerpoint/2010/main" xmlns="" Requires="p14">
+  <mc:AlternateContent xmlns:mc="http://schemas.openxmlformats.org/markup-compatibility/2006" xmlns:p14="http://schemas.microsoft.com/office/powerpoint/2010/main">
+    <mc:Choice Requires="p14">
       <p:transition spd="med" p14:dur="700">
         <p:fade/>
       </p:transition>
     </mc:Choice>
-    <mc:Fallback>
+    <mc:Fallback xmlns="">
       <p:transition spd="med">
         <p:fade/>
       </p:transition>
@@ -10621,13 +10500,13 @@
   <p:clrMapOvr>
     <a:masterClrMapping/>
   </p:clrMapOvr>
-  <mc:AlternateContent xmlns:mc="http://schemas.openxmlformats.org/markup-compatibility/2006">
-    <mc:Choice xmlns:p14="http://schemas.microsoft.com/office/powerpoint/2010/main" xmlns="" Requires="p14">
+  <mc:AlternateContent xmlns:mc="http://schemas.openxmlformats.org/markup-compatibility/2006" xmlns:p14="http://schemas.microsoft.com/office/powerpoint/2010/main">
+    <mc:Choice Requires="p14">
       <p:transition spd="med" p14:dur="700">
         <p:fade/>
       </p:transition>
     </mc:Choice>
-    <mc:Fallback>
+    <mc:Fallback xmlns="">
       <p:transition spd="med">
         <p:fade/>
       </p:transition>
@@ -10745,7 +10624,7 @@
                 <a:latin typeface="Times New Roman" panose="02020603050405020304" pitchFamily="18" charset="0"/>
                 <a:cs typeface="Times New Roman" panose="02020603050405020304" pitchFamily="18" charset="0"/>
               </a:rPr>
-              <a:t>HTML-5/CSS/Ts</a:t>
+              <a:t>HTML-5/CSS-3/Ts-4.5.2</a:t>
             </a:r>
           </a:p>
           <a:p>
@@ -10869,13 +10748,13 @@
   <p:clrMapOvr>
     <a:masterClrMapping/>
   </p:clrMapOvr>
-  <mc:AlternateContent xmlns:mc="http://schemas.openxmlformats.org/markup-compatibility/2006">
-    <mc:Choice xmlns:p14="http://schemas.microsoft.com/office/powerpoint/2010/main" xmlns="" Requires="p14">
+  <mc:AlternateContent xmlns:mc="http://schemas.openxmlformats.org/markup-compatibility/2006" xmlns:p14="http://schemas.microsoft.com/office/powerpoint/2010/main">
+    <mc:Choice Requires="p14">
       <p:transition spd="med" p14:dur="700">
         <p:fade/>
       </p:transition>
     </mc:Choice>
-    <mc:Fallback>
+    <mc:Fallback xmlns="">
       <p:transition spd="med">
         <p:fade/>
       </p:transition>
@@ -11379,7 +11258,7 @@
         </p:nvSpPr>
         <p:spPr>
           <a:xfrm>
-            <a:off x="6786917" y="1146212"/>
+            <a:off x="5346505" y="607586"/>
             <a:ext cx="1323720" cy="432898"/>
           </a:xfrm>
           <a:prstGeom prst="rect">
@@ -11415,7 +11294,7 @@
                 <a:latin typeface="Times New Roman" panose="02020603050405020304" pitchFamily="18" charset="0"/>
                 <a:cs typeface="Times New Roman" panose="02020603050405020304" pitchFamily="18" charset="0"/>
               </a:rPr>
-              <a:t>Category</a:t>
+              <a:t>Book Service</a:t>
             </a:r>
             <a:endParaRPr lang="en-IN" sz="1600" b="1" dirty="0">
               <a:solidFill>
@@ -11437,7 +11316,7 @@
         </p:nvSpPr>
         <p:spPr>
           <a:xfrm>
-            <a:off x="5331456" y="537412"/>
+            <a:off x="6986394" y="1187844"/>
             <a:ext cx="1237879" cy="353351"/>
           </a:xfrm>
           <a:prstGeom prst="rect">
@@ -11473,7 +11352,7 @@
                 <a:latin typeface="Times New Roman" panose="02020603050405020304" pitchFamily="18" charset="0"/>
                 <a:cs typeface="Times New Roman" panose="02020603050405020304" pitchFamily="18" charset="0"/>
               </a:rPr>
-              <a:t>Search By</a:t>
+              <a:t>Output</a:t>
             </a:r>
             <a:endParaRPr lang="en-IN" b="1" dirty="0">
               <a:solidFill>
@@ -11531,7 +11410,7 @@
                 <a:latin typeface="Times New Roman" panose="02020603050405020304" pitchFamily="18" charset="0"/>
                 <a:cs typeface="Times New Roman" panose="02020603050405020304" pitchFamily="18" charset="0"/>
               </a:rPr>
-              <a:t>Book Name</a:t>
+              <a:t>Login</a:t>
             </a:r>
           </a:p>
         </p:txBody>
@@ -12174,7 +12053,7 @@
         </p:nvSpPr>
         <p:spPr>
           <a:xfrm>
-            <a:off x="5274837" y="1155925"/>
+            <a:off x="5345244" y="1165321"/>
             <a:ext cx="1381895" cy="417190"/>
           </a:xfrm>
           <a:prstGeom prst="rect">
@@ -12210,7 +12089,7 @@
                 <a:latin typeface="Times New Roman" panose="02020603050405020304" pitchFamily="18" charset="0"/>
                 <a:cs typeface="Times New Roman" panose="02020603050405020304" pitchFamily="18" charset="0"/>
               </a:rPr>
-              <a:t>Author Name</a:t>
+              <a:t>Book Home</a:t>
             </a:r>
             <a:endParaRPr lang="en-IN" sz="1600" b="1" dirty="0">
               <a:solidFill>
@@ -12224,18 +12103,137 @@
           </a:p>
         </p:txBody>
       </p:sp>
+      <p:sp>
+        <p:nvSpPr>
+          <p:cNvPr id="26" name="Rectangle 25">
+            <a:extLst>
+              <a:ext uri="{FF2B5EF4-FFF2-40B4-BE49-F238E27FC236}">
+                <a16:creationId xmlns:a16="http://schemas.microsoft.com/office/drawing/2014/main" id="{80DBC146-9D25-4680-BE0C-8EE7AAF0AD5C}"/>
+              </a:ext>
+            </a:extLst>
+          </p:cNvPr>
+          <p:cNvSpPr/>
+          <p:nvPr/>
+        </p:nvSpPr>
+        <p:spPr>
+          <a:xfrm>
+            <a:off x="5345244" y="1639123"/>
+            <a:ext cx="1381895" cy="417190"/>
+          </a:xfrm>
+          <a:prstGeom prst="rect">
+            <a:avLst/>
+          </a:prstGeom>
+        </p:spPr>
+        <p:style>
+          <a:lnRef idx="2">
+            <a:schemeClr val="accent6"/>
+          </a:lnRef>
+          <a:fillRef idx="1">
+            <a:schemeClr val="lt1"/>
+          </a:fillRef>
+          <a:effectRef idx="0">
+            <a:schemeClr val="accent6"/>
+          </a:effectRef>
+          <a:fontRef idx="minor">
+            <a:schemeClr val="dk1"/>
+          </a:fontRef>
+        </p:style>
+        <p:txBody>
+          <a:bodyPr rtlCol="0" anchor="ctr"/>
+          <a:lstStyle/>
+          <a:p>
+            <a:pPr algn="ctr"/>
+            <a:r>
+              <a:rPr lang="en-US" sz="1600" b="1" dirty="0">
+                <a:solidFill>
+                  <a:schemeClr val="accent3">
+                    <a:lumMod val="75000"/>
+                  </a:schemeClr>
+                </a:solidFill>
+                <a:latin typeface="Times New Roman" panose="02020603050405020304" pitchFamily="18" charset="0"/>
+                <a:cs typeface="Times New Roman" panose="02020603050405020304" pitchFamily="18" charset="0"/>
+              </a:rPr>
+              <a:t>Model</a:t>
+            </a:r>
+            <a:endParaRPr lang="en-IN" sz="1600" b="1" dirty="0">
+              <a:solidFill>
+                <a:schemeClr val="accent3">
+                  <a:lumMod val="75000"/>
+                </a:schemeClr>
+              </a:solidFill>
+              <a:latin typeface="Times New Roman" panose="02020603050405020304" pitchFamily="18" charset="0"/>
+              <a:cs typeface="Times New Roman" panose="02020603050405020304" pitchFamily="18" charset="0"/>
+            </a:endParaRPr>
+          </a:p>
+        </p:txBody>
+      </p:sp>
+      <p:sp>
+        <p:nvSpPr>
+          <p:cNvPr id="27" name="Rectangle 26">
+            <a:extLst>
+              <a:ext uri="{FF2B5EF4-FFF2-40B4-BE49-F238E27FC236}">
+                <a16:creationId xmlns:a16="http://schemas.microsoft.com/office/drawing/2014/main" id="{BFFFCE61-2B48-48C9-8208-6E30E83AB42E}"/>
+              </a:ext>
+            </a:extLst>
+          </p:cNvPr>
+          <p:cNvSpPr/>
+          <p:nvPr/>
+        </p:nvSpPr>
+        <p:spPr>
+          <a:xfrm>
+            <a:off x="3941174" y="1625866"/>
+            <a:ext cx="1237879" cy="432898"/>
+          </a:xfrm>
+          <a:prstGeom prst="rect">
+            <a:avLst/>
+          </a:prstGeom>
+        </p:spPr>
+        <p:style>
+          <a:lnRef idx="2">
+            <a:schemeClr val="accent6"/>
+          </a:lnRef>
+          <a:fillRef idx="1">
+            <a:schemeClr val="lt1"/>
+          </a:fillRef>
+          <a:effectRef idx="0">
+            <a:schemeClr val="accent6"/>
+          </a:effectRef>
+          <a:fontRef idx="minor">
+            <a:schemeClr val="dk1"/>
+          </a:fontRef>
+        </p:style>
+        <p:txBody>
+          <a:bodyPr rtlCol="0" anchor="ctr"/>
+          <a:lstStyle/>
+          <a:p>
+            <a:pPr algn="ctr"/>
+            <a:r>
+              <a:rPr lang="en-US" sz="1500" b="1" dirty="0">
+                <a:solidFill>
+                  <a:schemeClr val="accent3">
+                    <a:lumMod val="75000"/>
+                  </a:schemeClr>
+                </a:solidFill>
+                <a:latin typeface="Times New Roman" panose="02020603050405020304" pitchFamily="18" charset="0"/>
+                <a:cs typeface="Times New Roman" panose="02020603050405020304" pitchFamily="18" charset="0"/>
+              </a:rPr>
+              <a:t>User Registration</a:t>
+            </a:r>
+          </a:p>
+        </p:txBody>
+      </p:sp>
     </p:spTree>
   </p:cSld>
   <p:clrMapOvr>
     <a:masterClrMapping/>
   </p:clrMapOvr>
-  <mc:AlternateContent xmlns:mc="http://schemas.openxmlformats.org/markup-compatibility/2006">
-    <mc:Choice xmlns:p14="http://schemas.microsoft.com/office/powerpoint/2010/main" xmlns="" Requires="p14">
+  <mc:AlternateContent xmlns:mc="http://schemas.openxmlformats.org/markup-compatibility/2006" xmlns:p14="http://schemas.microsoft.com/office/powerpoint/2010/main">
+    <mc:Choice Requires="p14">
       <p:transition spd="med" p14:dur="700">
         <p:fade/>
       </p:transition>
     </mc:Choice>
-    <mc:Fallback>
+    <mc:Fallback xmlns="">
       <p:transition spd="med">
         <p:fade/>
       </p:transition>
@@ -12725,14 +12723,7 @@
                 <a:latin typeface="Times New Roman" panose="02020603050405020304" pitchFamily="18" charset="0"/>
                 <a:cs typeface="Times New Roman" panose="02020603050405020304" pitchFamily="18" charset="0"/>
               </a:rPr>
-              <a:t>Search by </a:t>
-            </a:r>
-            <a:r>
-              <a:rPr lang="en-US" sz="1600" b="1" dirty="0" smtClean="0">
-                <a:latin typeface="Times New Roman" panose="02020603050405020304" pitchFamily="18" charset="0"/>
-                <a:cs typeface="Times New Roman" panose="02020603050405020304" pitchFamily="18" charset="0"/>
-              </a:rPr>
-              <a:t>Book Name</a:t>
+              <a:t>Search by Book Name</a:t>
             </a:r>
             <a:endParaRPr lang="en-IN" sz="1600" b="1" dirty="0">
               <a:latin typeface="Times New Roman" panose="02020603050405020304" pitchFamily="18" charset="0"/>
@@ -13513,7 +13504,7 @@
           <a:lstStyle/>
           <a:p>
             <a:r>
-              <a:rPr lang="en-US" sz="1600" b="1" dirty="0" smtClean="0">
+              <a:rPr lang="en-US" sz="1600" b="1" dirty="0">
                 <a:solidFill>
                   <a:schemeClr val="bg1"/>
                 </a:solidFill>
@@ -13522,13 +13513,6 @@
               </a:rPr>
               <a:t>Logout</a:t>
             </a:r>
-            <a:endParaRPr lang="en-US" sz="1600" b="1" dirty="0">
-              <a:solidFill>
-                <a:schemeClr val="bg1"/>
-              </a:solidFill>
-              <a:latin typeface="Times New Roman" pitchFamily="18" charset="0"/>
-              <a:cs typeface="Times New Roman" pitchFamily="18" charset="0"/>
-            </a:endParaRPr>
           </a:p>
         </p:txBody>
       </p:sp>
@@ -13537,13 +13521,13 @@
   <p:clrMapOvr>
     <a:masterClrMapping/>
   </p:clrMapOvr>
-  <mc:AlternateContent xmlns:mc="http://schemas.openxmlformats.org/markup-compatibility/2006">
-    <mc:Choice xmlns:p14="http://schemas.microsoft.com/office/powerpoint/2010/main" xmlns="" Requires="p14">
+  <mc:AlternateContent xmlns:mc="http://schemas.openxmlformats.org/markup-compatibility/2006" xmlns:p14="http://schemas.microsoft.com/office/powerpoint/2010/main">
+    <mc:Choice Requires="p14">
       <p:transition spd="med" p14:dur="700">
         <p:fade/>
       </p:transition>
     </mc:Choice>
-    <mc:Fallback>
+    <mc:Fallback xmlns="">
       <p:transition spd="med">
         <p:fade/>
       </p:transition>
@@ -13692,13 +13676,13 @@
   <p:clrMapOvr>
     <a:masterClrMapping/>
   </p:clrMapOvr>
-  <mc:AlternateContent xmlns:mc="http://schemas.openxmlformats.org/markup-compatibility/2006">
-    <mc:Choice xmlns:p14="http://schemas.microsoft.com/office/powerpoint/2010/main" xmlns="" Requires="p14">
+  <mc:AlternateContent xmlns:mc="http://schemas.openxmlformats.org/markup-compatibility/2006" xmlns:p14="http://schemas.microsoft.com/office/powerpoint/2010/main">
+    <mc:Choice Requires="p14">
       <p:transition spd="med" p14:dur="700">
         <p:fade/>
       </p:transition>
     </mc:Choice>
-    <mc:Fallback>
+    <mc:Fallback xmlns="">
       <p:transition spd="med">
         <p:fade/>
       </p:transition>
@@ -13969,7 +13953,7 @@
   <a:extraClrSchemeLst/>
   <a:extLst>
     <a:ext uri="{05A4C25C-085E-4340-85A3-A5531E510DB2}">
-      <thm15:themeFamily xmlns:thm15="http://schemas.microsoft.com/office/thememl/2012/main" xmlns="" name="Office Theme" id="{62F939B6-93AF-4DB8-9C6B-D6C7DFDC589F}" vid="{4A3C46E8-61CC-4603-A589-7422A47A8E4A}"/>
+      <thm15:themeFamily xmlns:thm15="http://schemas.microsoft.com/office/thememl/2012/main" name="Office Theme" id="{62F939B6-93AF-4DB8-9C6B-D6C7DFDC589F}" vid="{4A3C46E8-61CC-4603-A589-7422A47A8E4A}"/>
     </a:ext>
   </a:extLst>
 </a:theme>
@@ -14193,7 +14177,7 @@
   <a:extraClrSchemeLst/>
   <a:extLst>
     <a:ext uri="{05A4C25C-085E-4340-85A3-A5531E510DB2}">
-      <thm15:themeFamily xmlns:thm15="http://schemas.microsoft.com/office/thememl/2012/main" xmlns="" name="Office Theme" id="{62F939B6-93AF-4DB8-9C6B-D6C7DFDC589F}" vid="{4A3C46E8-61CC-4603-A589-7422A47A8E4A}"/>
+      <thm15:themeFamily xmlns:thm15="http://schemas.microsoft.com/office/thememl/2012/main" name="Office Theme" id="{62F939B6-93AF-4DB8-9C6B-D6C7DFDC589F}" vid="{4A3C46E8-61CC-4603-A589-7422A47A8E4A}"/>
     </a:ext>
   </a:extLst>
 </a:theme>
@@ -14417,7 +14401,7 @@
   <a:extraClrSchemeLst/>
   <a:extLst>
     <a:ext uri="{05A4C25C-085E-4340-85A3-A5531E510DB2}">
-      <thm15:themeFamily xmlns:thm15="http://schemas.microsoft.com/office/thememl/2012/main" xmlns="" name="Office Theme" id="{62F939B6-93AF-4DB8-9C6B-D6C7DFDC589F}" vid="{4A3C46E8-61CC-4603-A589-7422A47A8E4A}"/>
+      <thm15:themeFamily xmlns:thm15="http://schemas.microsoft.com/office/thememl/2012/main" name="Office Theme" id="{62F939B6-93AF-4DB8-9C6B-D6C7DFDC589F}" vid="{4A3C46E8-61CC-4603-A589-7422A47A8E4A}"/>
     </a:ext>
   </a:extLst>
 </a:theme>

</xml_diff>